<commit_message>
Added/modified CD PPTs, daa
</commit_message>
<xml_diff>
--- a/01. Design & Analysis of Algorithms/Notes & PPTs/6. Complexity Theory/6.2. P and NP.pptx
+++ b/01. Design & Analysis of Algorithms/Notes & PPTs/6. Complexity Theory/6.2. P and NP.pptx
@@ -186,6 +186,9 @@
         </p14:section>
       </p14:sectionLst>
     </p:ext>
+    <p:ext uri="{EFAFB233-063F-42B5-8137-9DF3F51BA10A}">
+      <p15:sldGuideLst xmlns:p15="http://schemas.microsoft.com/office/powerpoint/2012/main"/>
+    </p:ext>
   </p:extLst>
 </p:presentation>
 </file>
@@ -363,7 +366,7 @@
           <a:p>
             <a:fld id="{09C4B206-CDC9-4176-BDDC-787F8E655D3F}" type="datetimeFigureOut">
               <a:rPr lang="en-IN" smtClean="0"/>
-              <a:t>20-04-2020</a:t>
+              <a:t>28-04-2020</a:t>
             </a:fld>
             <a:endParaRPr lang="en-IN"/>
           </a:p>
@@ -4559,7 +4562,15 @@
             </a:r>
             <a:r>
               <a:rPr lang="en-US" dirty="0"/>
-              <a:t>: Some completely arbitrary string of characters s, is written beginning at some designated place in memory. Each time the algorithm is run, the string written may differ.</a:t>
+              <a:t>: Some completely arbitrary string of characters </a:t>
+            </a:r>
+            <a:r>
+              <a:rPr lang="en-US" i="1" dirty="0"/>
+              <a:t>s</a:t>
+            </a:r>
+            <a:r>
+              <a:rPr lang="en-US" dirty="0"/>
+              <a:t>, is written beginning at some designated place in memory. Each time the algorithm is run, the string written may differ.</a:t>
             </a:r>
           </a:p>
           <a:p>
@@ -4575,7 +4586,23 @@
             </a:r>
             <a:r>
               <a:rPr lang="en-US" dirty="0"/>
-              <a:t> A deterministic subroutine begins execution. In addition to the decision problem’s input, the subroutine may use s, or it may ignore s. Eventually it returns a value true or false – or it may get in an infinite loop and never halt. </a:t>
+              <a:t> A deterministic subroutine begins execution. In addition to the decision problem’s input, the subroutine may use </a:t>
+            </a:r>
+            <a:r>
+              <a:rPr lang="en-US" i="1" dirty="0"/>
+              <a:t>s</a:t>
+            </a:r>
+            <a:r>
+              <a:rPr lang="en-US" dirty="0"/>
+              <a:t>, or it may ignore </a:t>
+            </a:r>
+            <a:r>
+              <a:rPr lang="en-US" i="1" dirty="0"/>
+              <a:t>s</a:t>
+            </a:r>
+            <a:r>
+              <a:rPr lang="en-US" dirty="0"/>
+              <a:t>. Eventually it returns a value true or false – or it may get in an infinite loop and never halt. </a:t>
             </a:r>
           </a:p>
           <a:p>

</xml_diff>